<commit_message>
앱 추가 및 repository 작성
</commit_message>
<xml_diff>
--- a/졸업작품 Healing Ears 제안서.pptx
+++ b/졸업작품 Healing Ears 제안서.pptx
@@ -2348,7 +2348,7 @@
           <a:p>
             <a:fld id="{5F40E2F2-134D-47E5-9501-739A309E71CE}" type="datetimeFigureOut">
               <a:rPr lang="ko-KR" altLang="en-US" smtClean="0"/>
-              <a:t>2022-12-22</a:t>
+              <a:t>2022-12-30</a:t>
             </a:fld>
             <a:endParaRPr lang="ko-KR" altLang="en-US"/>
           </a:p>
@@ -2829,7 +2829,7 @@
           <a:p>
             <a:fld id="{C6942AEC-6DD4-4171-AA44-4013B2903ECE}" type="datetimeFigureOut">
               <a:rPr lang="ko-KR" altLang="en-US" smtClean="0"/>
-              <a:t>2022-12-22</a:t>
+              <a:t>2022-12-30</a:t>
             </a:fld>
             <a:endParaRPr lang="ko-KR" altLang="en-US"/>
           </a:p>
@@ -2997,7 +2997,7 @@
           <a:p>
             <a:fld id="{C6942AEC-6DD4-4171-AA44-4013B2903ECE}" type="datetimeFigureOut">
               <a:rPr lang="ko-KR" altLang="en-US" smtClean="0"/>
-              <a:t>2022-12-22</a:t>
+              <a:t>2022-12-30</a:t>
             </a:fld>
             <a:endParaRPr lang="ko-KR" altLang="en-US"/>
           </a:p>
@@ -3175,7 +3175,7 @@
           <a:p>
             <a:fld id="{C6942AEC-6DD4-4171-AA44-4013B2903ECE}" type="datetimeFigureOut">
               <a:rPr lang="ko-KR" altLang="en-US" smtClean="0"/>
-              <a:t>2022-12-22</a:t>
+              <a:t>2022-12-30</a:t>
             </a:fld>
             <a:endParaRPr lang="ko-KR" altLang="en-US"/>
           </a:p>
@@ -3343,7 +3343,7 @@
           <a:p>
             <a:fld id="{C6942AEC-6DD4-4171-AA44-4013B2903ECE}" type="datetimeFigureOut">
               <a:rPr lang="ko-KR" altLang="en-US" smtClean="0"/>
-              <a:t>2022-12-22</a:t>
+              <a:t>2022-12-30</a:t>
             </a:fld>
             <a:endParaRPr lang="ko-KR" altLang="en-US"/>
           </a:p>
@@ -3588,7 +3588,7 @@
           <a:p>
             <a:fld id="{C6942AEC-6DD4-4171-AA44-4013B2903ECE}" type="datetimeFigureOut">
               <a:rPr lang="ko-KR" altLang="en-US" smtClean="0"/>
-              <a:t>2022-12-22</a:t>
+              <a:t>2022-12-30</a:t>
             </a:fld>
             <a:endParaRPr lang="ko-KR" altLang="en-US"/>
           </a:p>
@@ -3817,7 +3817,7 @@
           <a:p>
             <a:fld id="{C6942AEC-6DD4-4171-AA44-4013B2903ECE}" type="datetimeFigureOut">
               <a:rPr lang="ko-KR" altLang="en-US" smtClean="0"/>
-              <a:t>2022-12-22</a:t>
+              <a:t>2022-12-30</a:t>
             </a:fld>
             <a:endParaRPr lang="ko-KR" altLang="en-US"/>
           </a:p>
@@ -4181,7 +4181,7 @@
           <a:p>
             <a:fld id="{C6942AEC-6DD4-4171-AA44-4013B2903ECE}" type="datetimeFigureOut">
               <a:rPr lang="ko-KR" altLang="en-US" smtClean="0"/>
-              <a:t>2022-12-22</a:t>
+              <a:t>2022-12-30</a:t>
             </a:fld>
             <a:endParaRPr lang="ko-KR" altLang="en-US"/>
           </a:p>
@@ -4298,7 +4298,7 @@
           <a:p>
             <a:fld id="{C6942AEC-6DD4-4171-AA44-4013B2903ECE}" type="datetimeFigureOut">
               <a:rPr lang="ko-KR" altLang="en-US" smtClean="0"/>
-              <a:t>2022-12-22</a:t>
+              <a:t>2022-12-30</a:t>
             </a:fld>
             <a:endParaRPr lang="ko-KR" altLang="en-US"/>
           </a:p>
@@ -4393,7 +4393,7 @@
           <a:p>
             <a:fld id="{C6942AEC-6DD4-4171-AA44-4013B2903ECE}" type="datetimeFigureOut">
               <a:rPr lang="ko-KR" altLang="en-US" smtClean="0"/>
-              <a:t>2022-12-22</a:t>
+              <a:t>2022-12-30</a:t>
             </a:fld>
             <a:endParaRPr lang="ko-KR" altLang="en-US"/>
           </a:p>
@@ -4668,7 +4668,7 @@
           <a:p>
             <a:fld id="{C6942AEC-6DD4-4171-AA44-4013B2903ECE}" type="datetimeFigureOut">
               <a:rPr lang="ko-KR" altLang="en-US" smtClean="0"/>
-              <a:t>2022-12-22</a:t>
+              <a:t>2022-12-30</a:t>
             </a:fld>
             <a:endParaRPr lang="ko-KR" altLang="en-US"/>
           </a:p>
@@ -4920,7 +4920,7 @@
           <a:p>
             <a:fld id="{C6942AEC-6DD4-4171-AA44-4013B2903ECE}" type="datetimeFigureOut">
               <a:rPr lang="ko-KR" altLang="en-US" smtClean="0"/>
-              <a:t>2022-12-22</a:t>
+              <a:t>2022-12-30</a:t>
             </a:fld>
             <a:endParaRPr lang="ko-KR" altLang="en-US"/>
           </a:p>
@@ -5131,7 +5131,7 @@
           <a:p>
             <a:fld id="{C6942AEC-6DD4-4171-AA44-4013B2903ECE}" type="datetimeFigureOut">
               <a:rPr lang="ko-KR" altLang="en-US" smtClean="0"/>
-              <a:t>2022-12-22</a:t>
+              <a:t>2022-12-30</a:t>
             </a:fld>
             <a:endParaRPr lang="ko-KR" altLang="en-US"/>
           </a:p>
@@ -12562,6 +12562,36 @@
           <a:chExt cx="0" cy="0"/>
         </a:xfrm>
       </p:grpSpPr>
+      <p:pic>
+        <p:nvPicPr>
+          <p:cNvPr id="10" name="그림 9">
+            <a:extLst>
+              <a:ext uri="{FF2B5EF4-FFF2-40B4-BE49-F238E27FC236}">
+                <a16:creationId xmlns:a16="http://schemas.microsoft.com/office/drawing/2014/main" id="{FEA7DC52-699A-7EDC-EBFA-B70C3AB2E24A}"/>
+              </a:ext>
+            </a:extLst>
+          </p:cNvPr>
+          <p:cNvPicPr>
+            <a:picLocks noChangeAspect="1"/>
+          </p:cNvPicPr>
+          <p:nvPr/>
+        </p:nvPicPr>
+        <p:blipFill>
+          <a:blip r:embed="rId2"/>
+          <a:stretch>
+            <a:fillRect/>
+          </a:stretch>
+        </p:blipFill>
+        <p:spPr>
+          <a:xfrm>
+            <a:off x="675216" y="647863"/>
+            <a:ext cx="9733049" cy="5660191"/>
+          </a:xfrm>
+          <a:prstGeom prst="rect">
+            <a:avLst/>
+          </a:prstGeom>
+        </p:spPr>
+      </p:pic>
       <p:sp>
         <p:nvSpPr>
           <p:cNvPr id="2" name="TextBox 1"/>
@@ -12758,42 +12788,13 @@
           <a:lstStyle/>
           <a:p>
             <a:r>
-              <a:rPr lang="ko-KR" altLang="en-US" dirty="0"/>
-              <a:t>https://github.com/jjy5045/AudioSharing</a:t>
-            </a:r>
+              <a:rPr lang="en-US" altLang="ko-KR" dirty="0"/>
+              <a:t>https://github.com/jjy5045/HealingEars</a:t>
+            </a:r>
+            <a:endParaRPr lang="ko-KR" altLang="en-US" dirty="0"/>
           </a:p>
         </p:txBody>
       </p:sp>
-      <p:pic>
-        <p:nvPicPr>
-          <p:cNvPr id="11" name="그림 10">
-            <a:extLst>
-              <a:ext uri="{FF2B5EF4-FFF2-40B4-BE49-F238E27FC236}">
-                <a16:creationId xmlns:a16="http://schemas.microsoft.com/office/drawing/2014/main" id="{FA7D0DA4-CD0D-FE0C-C0DA-E23FA5D7E671}"/>
-              </a:ext>
-            </a:extLst>
-          </p:cNvPr>
-          <p:cNvPicPr>
-            <a:picLocks noChangeAspect="1"/>
-          </p:cNvPicPr>
-          <p:nvPr/>
-        </p:nvPicPr>
-        <p:blipFill>
-          <a:blip r:embed="rId2"/>
-          <a:stretch>
-            <a:fillRect/>
-          </a:stretch>
-        </p:blipFill>
-        <p:spPr>
-          <a:xfrm>
-            <a:off x="931522" y="661154"/>
-            <a:ext cx="8726118" cy="5191850"/>
-          </a:xfrm>
-          <a:prstGeom prst="rect">
-            <a:avLst/>
-          </a:prstGeom>
-        </p:spPr>
-      </p:pic>
     </p:spTree>
     <p:extLst>
       <p:ext uri="{BB962C8B-B14F-4D97-AF65-F5344CB8AC3E}">

</xml_diff>